<commit_message>
yyt: update tut04 slides
</commit_message>
<xml_diff>
--- a/tutorial/T04/tut04.pptx
+++ b/tutorial/T04/tut04.pptx
@@ -133,30 +133,6 @@
 
 <file path=ppt/changesInfos/changesInfo1.xml><?xml version="1.0" encoding="utf-8"?>
 <pc:chgInfo xmlns:a="http://schemas.openxmlformats.org/drawingml/2006/main" xmlns:r="http://schemas.openxmlformats.org/officeDocument/2006/relationships" xmlns:ac="http://schemas.microsoft.com/office/drawing/2013/main/command" xmlns:pc="http://schemas.microsoft.com/office/powerpoint/2013/main/command">
-  <pc:docChgLst>
-    <pc:chgData name="Qingyu Song" userId="O4NG2utMRSC9bShTQouuMd1Uq3x00QhxVtEheGSGOoU=" providerId="None" clId="Web-{1A9491C6-FD31-4FA7-98FA-39E25D0B6578}"/>
-    <pc:docChg chg="modSld">
-      <pc:chgData name="Qingyu Song" userId="O4NG2utMRSC9bShTQouuMd1Uq3x00QhxVtEheGSGOoU=" providerId="None" clId="Web-{1A9491C6-FD31-4FA7-98FA-39E25D0B6578}" dt="2022-01-09T11:29:04.756" v="11" actId="20577"/>
-      <pc:docMkLst>
-        <pc:docMk/>
-      </pc:docMkLst>
-      <pc:sldChg chg="modSp">
-        <pc:chgData name="Qingyu Song" userId="O4NG2utMRSC9bShTQouuMd1Uq3x00QhxVtEheGSGOoU=" providerId="None" clId="Web-{1A9491C6-FD31-4FA7-98FA-39E25D0B6578}" dt="2022-01-09T11:29:04.756" v="11" actId="20577"/>
-        <pc:sldMkLst>
-          <pc:docMk/>
-          <pc:sldMk cId="1947847713" sldId="257"/>
-        </pc:sldMkLst>
-        <pc:spChg chg="mod">
-          <ac:chgData name="Qingyu Song" userId="O4NG2utMRSC9bShTQouuMd1Uq3x00QhxVtEheGSGOoU=" providerId="None" clId="Web-{1A9491C6-FD31-4FA7-98FA-39E25D0B6578}" dt="2022-01-09T11:29:04.756" v="11" actId="20577"/>
-          <ac:spMkLst>
-            <pc:docMk/>
-            <pc:sldMk cId="1947847713" sldId="257"/>
-            <ac:spMk id="3" creationId="{8F20472D-613F-3748-9CBD-88055CDB4B08}"/>
-          </ac:spMkLst>
-        </pc:spChg>
-      </pc:sldChg>
-    </pc:docChg>
-  </pc:docChgLst>
   <pc:docChgLst>
     <pc:chgData name="YANG, Yitao" userId="88e7822c-0337-4812-90b9-cac454a86cb3" providerId="ADAL" clId="{99F41875-7439-487D-9ECA-8FAFAEEE8A21}"/>
     <pc:docChg chg="undo custSel addSld modSld sldOrd">
@@ -962,6 +938,30 @@
       </pc:sldChg>
     </pc:docChg>
   </pc:docChgLst>
+  <pc:docChgLst>
+    <pc:chgData name="Qingyu Song" userId="O4NG2utMRSC9bShTQouuMd1Uq3x00QhxVtEheGSGOoU=" providerId="None" clId="Web-{1A9491C6-FD31-4FA7-98FA-39E25D0B6578}"/>
+    <pc:docChg chg="modSld">
+      <pc:chgData name="Qingyu Song" userId="O4NG2utMRSC9bShTQouuMd1Uq3x00QhxVtEheGSGOoU=" providerId="None" clId="Web-{1A9491C6-FD31-4FA7-98FA-39E25D0B6578}" dt="2022-01-09T11:29:04.756" v="11" actId="20577"/>
+      <pc:docMkLst>
+        <pc:docMk/>
+      </pc:docMkLst>
+      <pc:sldChg chg="modSp">
+        <pc:chgData name="Qingyu Song" userId="O4NG2utMRSC9bShTQouuMd1Uq3x00QhxVtEheGSGOoU=" providerId="None" clId="Web-{1A9491C6-FD31-4FA7-98FA-39E25D0B6578}" dt="2022-01-09T11:29:04.756" v="11" actId="20577"/>
+        <pc:sldMkLst>
+          <pc:docMk/>
+          <pc:sldMk cId="1947847713" sldId="257"/>
+        </pc:sldMkLst>
+        <pc:spChg chg="mod">
+          <ac:chgData name="Qingyu Song" userId="O4NG2utMRSC9bShTQouuMd1Uq3x00QhxVtEheGSGOoU=" providerId="None" clId="Web-{1A9491C6-FD31-4FA7-98FA-39E25D0B6578}" dt="2022-01-09T11:29:04.756" v="11" actId="20577"/>
+          <ac:spMkLst>
+            <pc:docMk/>
+            <pc:sldMk cId="1947847713" sldId="257"/>
+            <ac:spMk id="3" creationId="{8F20472D-613F-3748-9CBD-88055CDB4B08}"/>
+          </ac:spMkLst>
+        </pc:spChg>
+      </pc:sldChg>
+    </pc:docChg>
+  </pc:docChgLst>
 </pc:chgInfo>
 </file>
 
@@ -1047,7 +1047,7 @@
           <a:p>
             <a:fld id="{62FBE78F-E554-4806-A855-B19721C91D19}" type="datetimeFigureOut">
               <a:rPr lang="zh-CN" altLang="en-US" smtClean="0"/>
-              <a:t>2023/9/26</a:t>
+              <a:t>2023/9/27</a:t>
             </a:fld>
             <a:endParaRPr lang="zh-CN" altLang="en-US"/>
           </a:p>
@@ -1639,7 +1639,7 @@
           <a:p>
             <a:fld id="{2425905D-C0C4-D040-B3F5-79CCA23FA4EB}" type="datetimeFigureOut">
               <a:rPr lang="en-US" smtClean="0"/>
-              <a:t>9/26/2023</a:t>
+              <a:t>9/27/2023</a:t>
             </a:fld>
             <a:endParaRPr lang="en-US"/>
           </a:p>
@@ -1839,7 +1839,7 @@
           <a:p>
             <a:fld id="{2425905D-C0C4-D040-B3F5-79CCA23FA4EB}" type="datetimeFigureOut">
               <a:rPr lang="en-US" smtClean="0"/>
-              <a:t>9/26/2023</a:t>
+              <a:t>9/27/2023</a:t>
             </a:fld>
             <a:endParaRPr lang="en-US"/>
           </a:p>
@@ -2049,7 +2049,7 @@
           <a:p>
             <a:fld id="{2425905D-C0C4-D040-B3F5-79CCA23FA4EB}" type="datetimeFigureOut">
               <a:rPr lang="en-US" smtClean="0"/>
-              <a:t>9/26/2023</a:t>
+              <a:t>9/27/2023</a:t>
             </a:fld>
             <a:endParaRPr lang="en-US"/>
           </a:p>
@@ -2249,7 +2249,7 @@
           <a:p>
             <a:fld id="{2425905D-C0C4-D040-B3F5-79CCA23FA4EB}" type="datetimeFigureOut">
               <a:rPr lang="en-US" smtClean="0"/>
-              <a:t>9/26/2023</a:t>
+              <a:t>9/27/2023</a:t>
             </a:fld>
             <a:endParaRPr lang="en-US"/>
           </a:p>
@@ -2525,7 +2525,7 @@
           <a:p>
             <a:fld id="{2425905D-C0C4-D040-B3F5-79CCA23FA4EB}" type="datetimeFigureOut">
               <a:rPr lang="en-US" smtClean="0"/>
-              <a:t>9/26/2023</a:t>
+              <a:t>9/27/2023</a:t>
             </a:fld>
             <a:endParaRPr lang="en-US"/>
           </a:p>
@@ -2793,7 +2793,7 @@
           <a:p>
             <a:fld id="{2425905D-C0C4-D040-B3F5-79CCA23FA4EB}" type="datetimeFigureOut">
               <a:rPr lang="en-US" smtClean="0"/>
-              <a:t>9/26/2023</a:t>
+              <a:t>9/27/2023</a:t>
             </a:fld>
             <a:endParaRPr lang="en-US"/>
           </a:p>
@@ -3208,7 +3208,7 @@
           <a:p>
             <a:fld id="{2425905D-C0C4-D040-B3F5-79CCA23FA4EB}" type="datetimeFigureOut">
               <a:rPr lang="en-US" smtClean="0"/>
-              <a:t>9/26/2023</a:t>
+              <a:t>9/27/2023</a:t>
             </a:fld>
             <a:endParaRPr lang="en-US"/>
           </a:p>
@@ -3350,7 +3350,7 @@
           <a:p>
             <a:fld id="{2425905D-C0C4-D040-B3F5-79CCA23FA4EB}" type="datetimeFigureOut">
               <a:rPr lang="en-US" smtClean="0"/>
-              <a:t>9/26/2023</a:t>
+              <a:t>9/27/2023</a:t>
             </a:fld>
             <a:endParaRPr lang="en-US"/>
           </a:p>
@@ -3463,7 +3463,7 @@
           <a:p>
             <a:fld id="{2425905D-C0C4-D040-B3F5-79CCA23FA4EB}" type="datetimeFigureOut">
               <a:rPr lang="en-US" smtClean="0"/>
-              <a:t>9/26/2023</a:t>
+              <a:t>9/27/2023</a:t>
             </a:fld>
             <a:endParaRPr lang="en-US"/>
           </a:p>
@@ -3776,7 +3776,7 @@
           <a:p>
             <a:fld id="{2425905D-C0C4-D040-B3F5-79CCA23FA4EB}" type="datetimeFigureOut">
               <a:rPr lang="en-US" smtClean="0"/>
-              <a:t>9/26/2023</a:t>
+              <a:t>9/27/2023</a:t>
             </a:fld>
             <a:endParaRPr lang="en-US"/>
           </a:p>
@@ -4065,7 +4065,7 @@
           <a:p>
             <a:fld id="{2425905D-C0C4-D040-B3F5-79CCA23FA4EB}" type="datetimeFigureOut">
               <a:rPr lang="en-US" smtClean="0"/>
-              <a:t>9/26/2023</a:t>
+              <a:t>9/27/2023</a:t>
             </a:fld>
             <a:endParaRPr lang="en-US"/>
           </a:p>
@@ -4308,7 +4308,7 @@
           <a:p>
             <a:fld id="{2425905D-C0C4-D040-B3F5-79CCA23FA4EB}" type="datetimeFigureOut">
               <a:rPr lang="en-US" smtClean="0"/>
-              <a:t>9/26/2023</a:t>
+              <a:t>9/27/2023</a:t>
             </a:fld>
             <a:endParaRPr lang="en-US"/>
           </a:p>
@@ -4755,8 +4755,13 @@
           <a:p>
             <a:r>
               <a:rPr lang="en-US" sz="6600" b="1" dirty="0"/>
-              <a:t>CSCI 4430 - Spring 22</a:t>
-            </a:r>
+              <a:t>CSCI </a:t>
+            </a:r>
+            <a:r>
+              <a:rPr lang="en-US" sz="6600" b="1"/>
+              <a:t>4430 – Fall 23</a:t>
+            </a:r>
+            <a:endParaRPr lang="en-US" sz="6600" b="1" dirty="0"/>
           </a:p>
         </p:txBody>
       </p:sp>

</xml_diff>